<commit_message>
split meg waveform crop, syntax changes
</commit_message>
<xml_diff>
--- a/epi-template.pptx
+++ b/epi-template.pptx
@@ -1114,7 +1114,7 @@
         <p:spPr>
           <a:xfrm>
             <a:off x="3520440" y="1280160"/>
-            <a:ext cx="4261104" cy="5541264"/>
+            <a:ext cx="2103120" cy="5541264"/>
           </a:xfrm>
         </p:spPr>
         <p:txBody>
@@ -1925,6 +1925,36 @@
           </a:lstStyle>
           <a:p>
             <a:pPr lvl="0"/>
+            <a:endParaRPr lang="en-US" dirty="0"/>
+          </a:p>
+        </p:txBody>
+      </p:sp>
+      <p:sp>
+        <p:nvSpPr>
+          <p:cNvPr id="6" name="Picture Placeholder 5">
+            <a:extLst>
+              <a:ext uri="{FF2B5EF4-FFF2-40B4-BE49-F238E27FC236}">
+                <a16:creationId xmlns:a16="http://schemas.microsoft.com/office/drawing/2014/main" id="{31D71C4A-E83C-2095-3EC7-0FD0E6F0BF19}"/>
+              </a:ext>
+            </a:extLst>
+          </p:cNvPr>
+          <p:cNvSpPr>
+            <a:spLocks noGrp="1"/>
+          </p:cNvSpPr>
+          <p:nvPr>
+            <p:ph type="pic" sz="quarter" idx="39"/>
+          </p:nvPr>
+        </p:nvSpPr>
+        <p:spPr>
+          <a:xfrm>
+            <a:off x="5660136" y="1279525"/>
+            <a:ext cx="2103120" cy="5541264"/>
+          </a:xfrm>
+        </p:spPr>
+        <p:txBody>
+          <a:bodyPr/>
+          <a:lstStyle/>
+          <a:p>
             <a:endParaRPr lang="en-US" dirty="0"/>
           </a:p>
         </p:txBody>

</xml_diff>

<commit_message>
changed waveform slide layout
</commit_message>
<xml_diff>
--- a/epi-template.pptx
+++ b/epi-template.pptx
@@ -1083,7 +1083,7 @@
         </p:nvSpPr>
         <p:spPr>
           <a:xfrm>
-            <a:off x="1426464" y="1280160"/>
+            <a:off x="1517904" y="1280160"/>
             <a:ext cx="2057400" cy="5541264"/>
           </a:xfrm>
         </p:spPr>
@@ -1113,8 +1113,8 @@
         </p:nvSpPr>
         <p:spPr>
           <a:xfrm>
-            <a:off x="3520440" y="1280160"/>
-            <a:ext cx="2103120" cy="5541264"/>
+            <a:off x="3657600" y="1280160"/>
+            <a:ext cx="1828800" cy="5541264"/>
           </a:xfrm>
         </p:spPr>
         <p:txBody>
@@ -1263,7 +1263,7 @@
         </p:nvSpPr>
         <p:spPr>
           <a:xfrm>
-            <a:off x="4575646" y="877824"/>
+            <a:off x="4526280" y="877824"/>
             <a:ext cx="184731" cy="307777"/>
           </a:xfrm>
         </p:spPr>
@@ -1303,7 +1303,7 @@
         </p:nvSpPr>
         <p:spPr>
           <a:xfrm>
-            <a:off x="6642191" y="877824"/>
+            <a:off x="6400800" y="877824"/>
             <a:ext cx="184730" cy="307777"/>
           </a:xfrm>
         </p:spPr>
@@ -1343,7 +1343,7 @@
         </p:nvSpPr>
         <p:spPr>
           <a:xfrm>
-            <a:off x="4575647" y="1069848"/>
+            <a:off x="4526280" y="1069848"/>
             <a:ext cx="184730" cy="246221"/>
           </a:xfrm>
         </p:spPr>
@@ -1383,7 +1383,7 @@
         </p:nvSpPr>
         <p:spPr>
           <a:xfrm>
-            <a:off x="6638544" y="1069848"/>
+            <a:off x="6400800" y="1069848"/>
             <a:ext cx="184730" cy="246221"/>
           </a:xfrm>
         </p:spPr>
@@ -1623,7 +1623,7 @@
         </p:nvSpPr>
         <p:spPr>
           <a:xfrm>
-            <a:off x="7726680" y="182880"/>
+            <a:off x="7589520" y="210312"/>
             <a:ext cx="1380744" cy="1380744"/>
           </a:xfrm>
         </p:spPr>
@@ -1631,7 +1631,7 @@
           <a:bodyPr/>
           <a:lstStyle/>
           <a:p>
-            <a:endParaRPr lang="en-US"/>
+            <a:endParaRPr lang="en-US" dirty="0"/>
           </a:p>
         </p:txBody>
       </p:sp>
@@ -1653,7 +1653,7 @@
         </p:nvSpPr>
         <p:spPr>
           <a:xfrm>
-            <a:off x="8001000" y="1673352"/>
+            <a:off x="7626096" y="1673352"/>
             <a:ext cx="1371600" cy="585216"/>
           </a:xfrm>
           <a:noFill/>
@@ -1695,7 +1695,7 @@
         </p:nvSpPr>
         <p:spPr>
           <a:xfrm>
-            <a:off x="8001000" y="2816352"/>
+            <a:off x="7626096" y="2816352"/>
             <a:ext cx="1371600" cy="585216"/>
           </a:xfrm>
           <a:noFill/>
@@ -1737,7 +1737,7 @@
         </p:nvSpPr>
         <p:spPr>
           <a:xfrm>
-            <a:off x="8001000" y="3840480"/>
+            <a:off x="7626096" y="3840480"/>
             <a:ext cx="1371600" cy="585216"/>
           </a:xfrm>
           <a:noFill/>
@@ -1779,7 +1779,7 @@
         </p:nvSpPr>
         <p:spPr>
           <a:xfrm>
-            <a:off x="8001000" y="4626864"/>
+            <a:off x="7626096" y="4626864"/>
             <a:ext cx="1371600" cy="585216"/>
           </a:xfrm>
           <a:noFill/>
@@ -1821,7 +1821,7 @@
         </p:nvSpPr>
         <p:spPr>
           <a:xfrm>
-            <a:off x="8001000" y="5724144"/>
+            <a:off x="7626096" y="5724144"/>
             <a:ext cx="1371600" cy="585216"/>
           </a:xfrm>
           <a:noFill/>
@@ -1863,7 +1863,7 @@
         </p:nvSpPr>
         <p:spPr>
           <a:xfrm>
-            <a:off x="7644384" y="246888"/>
+            <a:off x="7507224" y="274320"/>
             <a:ext cx="246888" cy="219456"/>
           </a:xfrm>
           <a:noFill/>
@@ -1905,7 +1905,7 @@
         </p:nvSpPr>
         <p:spPr>
           <a:xfrm>
-            <a:off x="8906256" y="246888"/>
+            <a:off x="8769096" y="274320"/>
             <a:ext cx="256032" cy="210312"/>
           </a:xfrm>
           <a:noFill/>
@@ -1947,8 +1947,8 @@
         </p:nvSpPr>
         <p:spPr>
           <a:xfrm>
-            <a:off x="5660136" y="1279525"/>
-            <a:ext cx="2103120" cy="5541264"/>
+            <a:off x="5568696" y="1279525"/>
+            <a:ext cx="1828800" cy="5541264"/>
           </a:xfrm>
         </p:spPr>
         <p:txBody>

</xml_diff>